<commit_message>
Update One-Hot & Dummy Variable Encoding ppt
</commit_message>
<xml_diff>
--- a/My Note and Practice/Text to Numerical Data Conversion/Categorical(Text to Numeric) data conversion-CTtN/Nominal Data/CTNtN1. One-Hot & Dummy Variable Encoding/One-Hot & Dummy Variable Encoding.pptx
+++ b/My Note and Practice/Text to Numerical Data Conversion/Categorical(Text to Numeric) data conversion-CTtN/Nominal Data/CTNtN1. One-Hot & Dummy Variable Encoding/One-Hot & Dummy Variable Encoding.pptx
@@ -284,7 +284,7 @@
           <a:p>
             <a:fld id="{D6171EE1-2692-479A-A6A6-950CA86052A8}" type="datetimeFigureOut">
               <a:rPr lang="en-US" smtClean="0"/>
-              <a:t>11/8/2025</a:t>
+              <a:t>11/16/2025</a:t>
             </a:fld>
             <a:endParaRPr lang="en-US"/>
           </a:p>
@@ -482,7 +482,7 @@
           <a:p>
             <a:fld id="{D6171EE1-2692-479A-A6A6-950CA86052A8}" type="datetimeFigureOut">
               <a:rPr lang="en-US" smtClean="0"/>
-              <a:t>11/8/2025</a:t>
+              <a:t>11/16/2025</a:t>
             </a:fld>
             <a:endParaRPr lang="en-US"/>
           </a:p>
@@ -690,7 +690,7 @@
           <a:p>
             <a:fld id="{D6171EE1-2692-479A-A6A6-950CA86052A8}" type="datetimeFigureOut">
               <a:rPr lang="en-US" smtClean="0"/>
-              <a:t>11/8/2025</a:t>
+              <a:t>11/16/2025</a:t>
             </a:fld>
             <a:endParaRPr lang="en-US"/>
           </a:p>
@@ -888,7 +888,7 @@
           <a:p>
             <a:fld id="{D6171EE1-2692-479A-A6A6-950CA86052A8}" type="datetimeFigureOut">
               <a:rPr lang="en-US" smtClean="0"/>
-              <a:t>11/8/2025</a:t>
+              <a:t>11/16/2025</a:t>
             </a:fld>
             <a:endParaRPr lang="en-US"/>
           </a:p>
@@ -1163,7 +1163,7 @@
           <a:p>
             <a:fld id="{D6171EE1-2692-479A-A6A6-950CA86052A8}" type="datetimeFigureOut">
               <a:rPr lang="en-US" smtClean="0"/>
-              <a:t>11/8/2025</a:t>
+              <a:t>11/16/2025</a:t>
             </a:fld>
             <a:endParaRPr lang="en-US"/>
           </a:p>
@@ -1428,7 +1428,7 @@
           <a:p>
             <a:fld id="{D6171EE1-2692-479A-A6A6-950CA86052A8}" type="datetimeFigureOut">
               <a:rPr lang="en-US" smtClean="0"/>
-              <a:t>11/8/2025</a:t>
+              <a:t>11/16/2025</a:t>
             </a:fld>
             <a:endParaRPr lang="en-US"/>
           </a:p>
@@ -1840,7 +1840,7 @@
           <a:p>
             <a:fld id="{D6171EE1-2692-479A-A6A6-950CA86052A8}" type="datetimeFigureOut">
               <a:rPr lang="en-US" smtClean="0"/>
-              <a:t>11/8/2025</a:t>
+              <a:t>11/16/2025</a:t>
             </a:fld>
             <a:endParaRPr lang="en-US"/>
           </a:p>
@@ -1981,7 +1981,7 @@
           <a:p>
             <a:fld id="{D6171EE1-2692-479A-A6A6-950CA86052A8}" type="datetimeFigureOut">
               <a:rPr lang="en-US" smtClean="0"/>
-              <a:t>11/8/2025</a:t>
+              <a:t>11/16/2025</a:t>
             </a:fld>
             <a:endParaRPr lang="en-US"/>
           </a:p>
@@ -2094,7 +2094,7 @@
           <a:p>
             <a:fld id="{D6171EE1-2692-479A-A6A6-950CA86052A8}" type="datetimeFigureOut">
               <a:rPr lang="en-US" smtClean="0"/>
-              <a:t>11/8/2025</a:t>
+              <a:t>11/16/2025</a:t>
             </a:fld>
             <a:endParaRPr lang="en-US"/>
           </a:p>
@@ -2405,7 +2405,7 @@
           <a:p>
             <a:fld id="{D6171EE1-2692-479A-A6A6-950CA86052A8}" type="datetimeFigureOut">
               <a:rPr lang="en-US" smtClean="0"/>
-              <a:t>11/8/2025</a:t>
+              <a:t>11/16/2025</a:t>
             </a:fld>
             <a:endParaRPr lang="en-US"/>
           </a:p>
@@ -2693,7 +2693,7 @@
           <a:p>
             <a:fld id="{D6171EE1-2692-479A-A6A6-950CA86052A8}" type="datetimeFigureOut">
               <a:rPr lang="en-US" smtClean="0"/>
-              <a:t>11/8/2025</a:t>
+              <a:t>11/16/2025</a:t>
             </a:fld>
             <a:endParaRPr lang="en-US"/>
           </a:p>
@@ -2934,7 +2934,7 @@
           <a:p>
             <a:fld id="{D6171EE1-2692-479A-A6A6-950CA86052A8}" type="datetimeFigureOut">
               <a:rPr lang="en-US" smtClean="0"/>
-              <a:t>11/8/2025</a:t>
+              <a:t>11/16/2025</a:t>
             </a:fld>
             <a:endParaRPr lang="en-US"/>
           </a:p>

</xml_diff>